<commit_message>
Reduced file size of slide
</commit_message>
<xml_diff>
--- a/accessors/web/library/presentations/AccessorsPoster2016.pptx
+++ b/accessors/web/library/presentations/AccessorsPoster2016.pptx
@@ -934,7 +934,7 @@
             </a:pPr>
             <a:fld id="{1BA1FE3D-A8A3-3B45-AD1F-AB619885582F}" type="datetime4">
               <a:rPr lang="en-US" smtClean="0"/>
-              <a:t>October 4, 2016</a:t>
+              <a:t>October 5, 2016</a:t>
             </a:fld>
             <a:endParaRPr lang="en-US" dirty="0"/>
           </a:p>
@@ -2029,7 +2029,7 @@
               <a:pPr>
                 <a:defRPr/>
               </a:pPr>
-              <a:t>October 4, 2016</a:t>
+              <a:t>October 5, 2016</a:t>
             </a:fld>
             <a:endParaRPr lang="en-US" dirty="0"/>
           </a:p>
@@ -2450,16 +2450,16 @@
           <a:lstStyle/>
           <a:p>
             <a:r>
-              <a:rPr lang="en-US" dirty="0"/>
-              <a:t>Scalable </a:t>
-            </a:r>
-            <a:r>
-              <a:rPr lang="en-US" dirty="0" err="1"/>
+              <a:rPr lang="en-US" dirty="0" smtClean="0"/>
+              <a:t>Accessors: Scalable </a:t>
+            </a:r>
+            <a:r>
+              <a:rPr lang="en-US" dirty="0" err="1" smtClean="0"/>
               <a:t>IoT</a:t>
             </a:r>
             <a:r>
-              <a:rPr lang="en-US"/>
-              <a:t> with Accessors</a:t>
+              <a:rPr lang="en-US" dirty="0" smtClean="0"/>
+              <a:t> Programming</a:t>
             </a:r>
             <a:endParaRPr lang="en-US" dirty="0"/>
           </a:p>
@@ -2485,7 +2485,7 @@
             </a:pPr>
             <a:fld id="{1BA1FE3D-A8A3-3B45-AD1F-AB619885582F}" type="datetime4">
               <a:rPr lang="en-US" smtClean="0"/>
-              <a:t>October 4, 2016</a:t>
+              <a:t>October 7, 2016</a:t>
             </a:fld>
             <a:endParaRPr lang="en-US" dirty="0"/>
           </a:p>
@@ -2520,107 +2520,87 @@
             <p:ph sz="quarter" idx="12"/>
           </p:nvPr>
         </p:nvSpPr>
-        <p:spPr/>
+        <p:spPr>
+          <a:xfrm>
+            <a:off x="413828" y="4465562"/>
+            <a:ext cx="26637172" cy="5206514"/>
+          </a:xfrm>
+        </p:spPr>
         <p:txBody>
           <a:bodyPr/>
           <a:lstStyle/>
           <a:p>
-            <a:endParaRPr lang="en-US"/>
-          </a:p>
-        </p:txBody>
-      </p:sp>
-      <p:sp>
-        <p:nvSpPr>
-          <p:cNvPr id="6" name="Content Placeholder 5"/>
-          <p:cNvSpPr>
-            <a:spLocks noGrp="1"/>
-          </p:cNvSpPr>
-          <p:nvPr>
-            <p:ph sz="quarter" idx="13"/>
-          </p:nvPr>
-        </p:nvSpPr>
-        <p:spPr/>
-        <p:txBody>
-          <a:bodyPr/>
-          <a:lstStyle/>
-          <a:p>
-            <a:endParaRPr lang="en-US"/>
-          </a:p>
-        </p:txBody>
-      </p:sp>
-      <p:sp>
-        <p:nvSpPr>
-          <p:cNvPr id="7" name="Content Placeholder 6"/>
-          <p:cNvSpPr>
-            <a:spLocks noGrp="1"/>
-          </p:cNvSpPr>
-          <p:nvPr>
-            <p:ph sz="quarter" idx="14"/>
-          </p:nvPr>
-        </p:nvSpPr>
-        <p:spPr/>
-        <p:txBody>
-          <a:bodyPr/>
-          <a:lstStyle/>
-          <a:p>
-            <a:endParaRPr lang="en-US"/>
-          </a:p>
-        </p:txBody>
-      </p:sp>
-      <p:sp>
-        <p:nvSpPr>
-          <p:cNvPr id="8" name="Content Placeholder 7"/>
-          <p:cNvSpPr>
-            <a:spLocks noGrp="1"/>
-          </p:cNvSpPr>
-          <p:nvPr>
-            <p:ph sz="quarter" idx="15"/>
-          </p:nvPr>
-        </p:nvSpPr>
-        <p:spPr/>
-        <p:txBody>
-          <a:bodyPr/>
-          <a:lstStyle/>
-          <a:p>
-            <a:endParaRPr lang="en-US"/>
-          </a:p>
-        </p:txBody>
-      </p:sp>
-      <p:sp>
-        <p:nvSpPr>
-          <p:cNvPr id="9" name="Content Placeholder 8"/>
-          <p:cNvSpPr>
-            <a:spLocks noGrp="1"/>
-          </p:cNvSpPr>
-          <p:nvPr>
-            <p:ph sz="quarter" idx="16"/>
-          </p:nvPr>
-        </p:nvSpPr>
-        <p:spPr/>
-        <p:txBody>
-          <a:bodyPr/>
-          <a:lstStyle/>
-          <a:p>
-            <a:endParaRPr lang="en-US"/>
-          </a:p>
-        </p:txBody>
-      </p:sp>
-      <p:sp>
-        <p:nvSpPr>
-          <p:cNvPr id="10" name="Content Placeholder 9"/>
-          <p:cNvSpPr>
-            <a:spLocks noGrp="1"/>
-          </p:cNvSpPr>
-          <p:nvPr>
-            <p:ph sz="quarter" idx="17"/>
-          </p:nvPr>
-        </p:nvSpPr>
-        <p:spPr/>
-        <p:txBody>
-          <a:bodyPr/>
-          <a:lstStyle/>
-          <a:p>
-            <a:endParaRPr lang="en-US"/>
+            <a:r>
+              <a:rPr lang="en-US" sz="6600" dirty="0" smtClean="0">
+                <a:latin typeface="+mj-lt"/>
+              </a:rPr>
+              <a:t>Write once, run anywhere (picture of lots of hosts?)</a:t>
+            </a:r>
+          </a:p>
+          <a:p>
+            <a:r>
+              <a:rPr lang="en-US" dirty="0"/>
+              <a:t> </a:t>
+            </a:r>
+            <a:r>
+              <a:rPr lang="en-US" dirty="0" smtClean="0"/>
+              <a:t>  Basics:  actor oriented operating on streams</a:t>
+            </a:r>
+          </a:p>
+          <a:p>
+            <a:r>
+              <a:rPr lang="en-US" dirty="0"/>
+              <a:t> </a:t>
+            </a:r>
+            <a:r>
+              <a:rPr lang="en-US" dirty="0" smtClean="0"/>
+              <a:t>  Extreme heterogeneity in host space: </a:t>
+            </a:r>
+            <a:r>
+              <a:rPr lang="en-US" dirty="0"/>
+              <a:t> capability and power constrained </a:t>
+            </a:r>
+            <a:r>
+              <a:rPr lang="en-US" dirty="0" err="1"/>
+              <a:t>IoT</a:t>
+            </a:r>
+            <a:r>
+              <a:rPr lang="en-US" dirty="0"/>
+              <a:t> devices (Anne</a:t>
+            </a:r>
+            <a:r>
+              <a:rPr lang="en-US" dirty="0" smtClean="0"/>
+              <a:t>) how to pick the hosts</a:t>
+            </a:r>
+          </a:p>
+          <a:p>
+            <a:r>
+              <a:rPr lang="en-US" dirty="0" smtClean="0"/>
+              <a:t>Picture of Java, /enterprise, browser, node host / </a:t>
+            </a:r>
+            <a:r>
+              <a:rPr lang="en-US" dirty="0" err="1" smtClean="0"/>
+              <a:t>swarmbox</a:t>
+            </a:r>
+            <a:r>
+              <a:rPr lang="en-US" dirty="0" smtClean="0"/>
+              <a:t>, Android phone</a:t>
+            </a:r>
+          </a:p>
+          <a:p>
+            <a:r>
+              <a:rPr lang="en-US" dirty="0" smtClean="0"/>
+              <a:t>- Module has host-dependent code; top level has </a:t>
+            </a:r>
+            <a:r>
+              <a:rPr lang="en-US" dirty="0" err="1" smtClean="0"/>
+              <a:t>Javascript</a:t>
+            </a:r>
+            <a:r>
+              <a:rPr lang="en-US" dirty="0" smtClean="0"/>
+              <a:t> only</a:t>
+            </a:r>
+            <a:endParaRPr lang="en-US" dirty="0"/>
           </a:p>
         </p:txBody>
       </p:sp>
@@ -2647,6 +2627,207 @@
           <a:lstStyle/>
           <a:p>
             <a:endParaRPr lang="en-US"/>
+          </a:p>
+        </p:txBody>
+      </p:sp>
+      <p:sp>
+        <p:nvSpPr>
+          <p:cNvPr id="12" name="Content Placeholder 4"/>
+          <p:cNvSpPr>
+            <a:spLocks noGrp="1"/>
+          </p:cNvSpPr>
+          <p:nvPr>
+            <p:ph sz="quarter" idx="12"/>
+          </p:nvPr>
+        </p:nvSpPr>
+        <p:spPr>
+          <a:xfrm>
+            <a:off x="506161" y="11272276"/>
+            <a:ext cx="26637172" cy="6174862"/>
+          </a:xfrm>
+        </p:spPr>
+        <p:txBody>
+          <a:bodyPr/>
+          <a:lstStyle/>
+          <a:p>
+            <a:r>
+              <a:rPr lang="en-US" sz="6600" dirty="0" smtClean="0">
+                <a:latin typeface="+mj-lt"/>
+              </a:rPr>
+              <a:t>Take it to a higher level</a:t>
+            </a:r>
+          </a:p>
+          <a:p>
+            <a:r>
+              <a:rPr lang="en-US" sz="6600" dirty="0"/>
+              <a:t>Of abstraction.  Watch example.  Possibly leverage ontologies / generate ontologies</a:t>
+            </a:r>
+            <a:r>
+              <a:rPr lang="en-US" sz="6600" dirty="0" smtClean="0"/>
+              <a:t>.</a:t>
+            </a:r>
+          </a:p>
+          <a:p>
+            <a:r>
+              <a:rPr lang="en-US" sz="6600" dirty="0" smtClean="0"/>
+              <a:t>Picture – architecture of watch</a:t>
+            </a:r>
+          </a:p>
+          <a:p>
+            <a:r>
+              <a:rPr lang="en-US" sz="6600" dirty="0" err="1" smtClean="0"/>
+              <a:t>Heterogenity</a:t>
+            </a:r>
+            <a:r>
+              <a:rPr lang="en-US" sz="6600" dirty="0" smtClean="0"/>
+              <a:t> at application level</a:t>
+            </a:r>
+            <a:endParaRPr lang="en-US" sz="6600" dirty="0"/>
+          </a:p>
+          <a:p>
+            <a:endParaRPr lang="en-US" dirty="0"/>
+          </a:p>
+        </p:txBody>
+      </p:sp>
+      <p:sp>
+        <p:nvSpPr>
+          <p:cNvPr id="14" name="Content Placeholder 4"/>
+          <p:cNvSpPr>
+            <a:spLocks noGrp="1"/>
+          </p:cNvSpPr>
+          <p:nvPr>
+            <p:ph sz="quarter" idx="12"/>
+          </p:nvPr>
+        </p:nvSpPr>
+        <p:spPr>
+          <a:xfrm>
+            <a:off x="556718" y="17750001"/>
+            <a:ext cx="26637172" cy="6176800"/>
+          </a:xfrm>
+        </p:spPr>
+        <p:txBody>
+          <a:bodyPr/>
+          <a:lstStyle/>
+          <a:p>
+            <a:r>
+              <a:rPr lang="en-US" sz="6600" dirty="0">
+                <a:latin typeface="+mj-lt"/>
+              </a:rPr>
+              <a:t>You’re in </a:t>
+            </a:r>
+            <a:r>
+              <a:rPr lang="en-US" sz="6600" dirty="0" smtClean="0">
+                <a:latin typeface="+mj-lt"/>
+              </a:rPr>
+              <a:t>control</a:t>
+            </a:r>
+          </a:p>
+          <a:p>
+            <a:r>
+              <a:rPr lang="en-US" sz="6600" dirty="0"/>
+              <a:t>Stuff about control loops.  Maybe put after abstraction since it’s not done yet.</a:t>
+            </a:r>
+          </a:p>
+          <a:p>
+            <a:r>
+              <a:rPr lang="en-US" sz="6600" dirty="0"/>
+              <a:t>Stuff about models of computation and assuring real time.  Real time != real fast.  You’re operating on a plant</a:t>
+            </a:r>
+            <a:r>
+              <a:rPr lang="en-US" sz="6600" dirty="0" smtClean="0"/>
+              <a:t>.  Testing here?  Or separate section?  Example with control strategies.  </a:t>
+            </a:r>
+            <a:endParaRPr lang="en-US" dirty="0"/>
+          </a:p>
+        </p:txBody>
+      </p:sp>
+      <p:sp>
+        <p:nvSpPr>
+          <p:cNvPr id="16" name="Content Placeholder 4"/>
+          <p:cNvSpPr>
+            <a:spLocks noGrp="1"/>
+          </p:cNvSpPr>
+          <p:nvPr>
+            <p:ph sz="quarter" idx="12"/>
+          </p:nvPr>
+        </p:nvSpPr>
+        <p:spPr>
+          <a:xfrm>
+            <a:off x="598494" y="24229665"/>
+            <a:ext cx="26637172" cy="6250336"/>
+          </a:xfrm>
+        </p:spPr>
+        <p:txBody>
+          <a:bodyPr/>
+          <a:lstStyle/>
+          <a:p>
+            <a:r>
+              <a:rPr lang="en-US" sz="6600" dirty="0" smtClean="0">
+                <a:latin typeface="+mj-lt"/>
+              </a:rPr>
+              <a:t>Guaranteed (other word?)</a:t>
+            </a:r>
+          </a:p>
+          <a:p>
+            <a:r>
+              <a:rPr lang="en-US" sz="6600" dirty="0"/>
+              <a:t>Something about contracts and security / something about control loops</a:t>
+            </a:r>
+            <a:endParaRPr lang="en-US" dirty="0"/>
+          </a:p>
+        </p:txBody>
+      </p:sp>
+      <p:sp>
+        <p:nvSpPr>
+          <p:cNvPr id="17" name="Content Placeholder 4"/>
+          <p:cNvSpPr>
+            <a:spLocks noGrp="1"/>
+          </p:cNvSpPr>
+          <p:nvPr>
+            <p:ph sz="quarter" idx="12"/>
+          </p:nvPr>
+        </p:nvSpPr>
+        <p:spPr>
+          <a:xfrm>
+            <a:off x="598494" y="30782865"/>
+            <a:ext cx="26637172" cy="3430935"/>
+          </a:xfrm>
+        </p:spPr>
+        <p:txBody>
+          <a:bodyPr/>
+          <a:lstStyle/>
+          <a:p>
+            <a:r>
+              <a:rPr lang="en-US" sz="6600" dirty="0" smtClean="0">
+                <a:latin typeface="+mj-lt"/>
+              </a:rPr>
+              <a:t>References</a:t>
+            </a:r>
+          </a:p>
+          <a:p>
+            <a:r>
+              <a:rPr lang="en-US" sz="6600" dirty="0" smtClean="0">
+                <a:latin typeface="+mj-lt"/>
+              </a:rPr>
+              <a:t>Demos, other posters, etc.?</a:t>
+            </a:r>
+          </a:p>
+          <a:p>
+            <a:r>
+              <a:rPr lang="en-US" sz="6600" dirty="0" smtClean="0">
+                <a:latin typeface="+mj-lt"/>
+              </a:rPr>
+              <a:t>Website – run online  .  Solicit ideas?  Castle in </a:t>
+            </a:r>
+            <a:r>
+              <a:rPr lang="en-US" sz="6600" smtClean="0">
+                <a:latin typeface="+mj-lt"/>
+              </a:rPr>
+              <a:t>clouds quote?</a:t>
+            </a:r>
+            <a:endParaRPr lang="en-US" sz="6600" dirty="0" smtClean="0">
+              <a:latin typeface="+mj-lt"/>
+            </a:endParaRPr>
           </a:p>
         </p:txBody>
       </p:sp>

</xml_diff>